<commit_message>
Update guidelines with spanish support
</commit_message>
<xml_diff>
--- a/documentation/SpanishMedicaLLM.pptx
+++ b/documentation/SpanishMedicaLLM.pptx
@@ -18,7 +18,9 @@
     <p:sldId id="261" r:id="rId12"/>
     <p:sldId id="269" r:id="rId13"/>
     <p:sldId id="262" r:id="rId14"/>
-    <p:sldId id="267" r:id="rId15"/>
+    <p:sldId id="272" r:id="rId15"/>
+    <p:sldId id="273" r:id="rId16"/>
+    <p:sldId id="267" r:id="rId17"/>
   </p:sldIdLst>
   <p:sldSz cx="12192000" cy="6858000"/>
   <p:notesSz cx="6858000" cy="9144000"/>
@@ -274,7 +276,7 @@
           <a:p>
             <a:fld id="{BE965B01-A514-4176-8242-ABBF95CAD36E}" type="datetimeFigureOut">
               <a:rPr lang="en-US" smtClean="0"/>
-              <a:t>3/18/2024</a:t>
+              <a:t>3/25/2024</a:t>
             </a:fld>
             <a:endParaRPr lang="en-US"/>
           </a:p>
@@ -474,7 +476,7 @@
           <a:p>
             <a:fld id="{BE965B01-A514-4176-8242-ABBF95CAD36E}" type="datetimeFigureOut">
               <a:rPr lang="en-US" smtClean="0"/>
-              <a:t>3/18/2024</a:t>
+              <a:t>3/25/2024</a:t>
             </a:fld>
             <a:endParaRPr lang="en-US"/>
           </a:p>
@@ -684,7 +686,7 @@
           <a:p>
             <a:fld id="{BE965B01-A514-4176-8242-ABBF95CAD36E}" type="datetimeFigureOut">
               <a:rPr lang="en-US" smtClean="0"/>
-              <a:t>3/18/2024</a:t>
+              <a:t>3/25/2024</a:t>
             </a:fld>
             <a:endParaRPr lang="en-US"/>
           </a:p>
@@ -884,7 +886,7 @@
           <a:p>
             <a:fld id="{BE965B01-A514-4176-8242-ABBF95CAD36E}" type="datetimeFigureOut">
               <a:rPr lang="en-US" smtClean="0"/>
-              <a:t>3/18/2024</a:t>
+              <a:t>3/25/2024</a:t>
             </a:fld>
             <a:endParaRPr lang="en-US"/>
           </a:p>
@@ -1160,7 +1162,7 @@
           <a:p>
             <a:fld id="{BE965B01-A514-4176-8242-ABBF95CAD36E}" type="datetimeFigureOut">
               <a:rPr lang="en-US" smtClean="0"/>
-              <a:t>3/18/2024</a:t>
+              <a:t>3/25/2024</a:t>
             </a:fld>
             <a:endParaRPr lang="en-US"/>
           </a:p>
@@ -1428,7 +1430,7 @@
           <a:p>
             <a:fld id="{BE965B01-A514-4176-8242-ABBF95CAD36E}" type="datetimeFigureOut">
               <a:rPr lang="en-US" smtClean="0"/>
-              <a:t>3/18/2024</a:t>
+              <a:t>3/25/2024</a:t>
             </a:fld>
             <a:endParaRPr lang="en-US"/>
           </a:p>
@@ -1843,7 +1845,7 @@
           <a:p>
             <a:fld id="{BE965B01-A514-4176-8242-ABBF95CAD36E}" type="datetimeFigureOut">
               <a:rPr lang="en-US" smtClean="0"/>
-              <a:t>3/18/2024</a:t>
+              <a:t>3/25/2024</a:t>
             </a:fld>
             <a:endParaRPr lang="en-US"/>
           </a:p>
@@ -1985,7 +1987,7 @@
           <a:p>
             <a:fld id="{BE965B01-A514-4176-8242-ABBF95CAD36E}" type="datetimeFigureOut">
               <a:rPr lang="en-US" smtClean="0"/>
-              <a:t>3/18/2024</a:t>
+              <a:t>3/25/2024</a:t>
             </a:fld>
             <a:endParaRPr lang="en-US"/>
           </a:p>
@@ -2098,7 +2100,7 @@
           <a:p>
             <a:fld id="{BE965B01-A514-4176-8242-ABBF95CAD36E}" type="datetimeFigureOut">
               <a:rPr lang="en-US" smtClean="0"/>
-              <a:t>3/18/2024</a:t>
+              <a:t>3/25/2024</a:t>
             </a:fld>
             <a:endParaRPr lang="en-US"/>
           </a:p>
@@ -2411,7 +2413,7 @@
           <a:p>
             <a:fld id="{BE965B01-A514-4176-8242-ABBF95CAD36E}" type="datetimeFigureOut">
               <a:rPr lang="en-US" smtClean="0"/>
-              <a:t>3/18/2024</a:t>
+              <a:t>3/25/2024</a:t>
             </a:fld>
             <a:endParaRPr lang="en-US"/>
           </a:p>
@@ -2700,7 +2702,7 @@
           <a:p>
             <a:fld id="{BE965B01-A514-4176-8242-ABBF95CAD36E}" type="datetimeFigureOut">
               <a:rPr lang="en-US" smtClean="0"/>
-              <a:t>3/18/2024</a:t>
+              <a:t>3/25/2024</a:t>
             </a:fld>
             <a:endParaRPr lang="en-US"/>
           </a:p>
@@ -2943,7 +2945,7 @@
           <a:p>
             <a:fld id="{BE965B01-A514-4176-8242-ABBF95CAD36E}" type="datetimeFigureOut">
               <a:rPr lang="en-US" smtClean="0"/>
-              <a:t>3/18/2024</a:t>
+              <a:t>3/25/2024</a:t>
             </a:fld>
             <a:endParaRPr lang="en-US"/>
           </a:p>
@@ -5713,6 +5715,766 @@
           <p:cNvPr id="2" name="Título 1">
             <a:extLst>
               <a:ext uri="{FF2B5EF4-FFF2-40B4-BE49-F238E27FC236}">
+                <a16:creationId xmlns:a16="http://schemas.microsoft.com/office/drawing/2014/main" id="{C0A21EDE-B48B-623F-614A-6E3C2FF3B003}"/>
+              </a:ext>
+            </a:extLst>
+          </p:cNvPr>
+          <p:cNvSpPr>
+            <a:spLocks noGrp="1"/>
+          </p:cNvSpPr>
+          <p:nvPr>
+            <p:ph type="title"/>
+          </p:nvPr>
+        </p:nvSpPr>
+        <p:spPr/>
+        <p:txBody>
+          <a:bodyPr/>
+          <a:lstStyle/>
+          <a:p>
+            <a:endParaRPr lang="en-US"/>
+          </a:p>
+        </p:txBody>
+      </p:sp>
+      <p:sp>
+        <p:nvSpPr>
+          <p:cNvPr id="3" name="Marcador de contenido 2">
+            <a:extLst>
+              <a:ext uri="{FF2B5EF4-FFF2-40B4-BE49-F238E27FC236}">
+                <a16:creationId xmlns:a16="http://schemas.microsoft.com/office/drawing/2014/main" id="{DF03179D-E25D-832F-76EC-9585D1CBF3FE}"/>
+              </a:ext>
+            </a:extLst>
+          </p:cNvPr>
+          <p:cNvSpPr>
+            <a:spLocks noGrp="1"/>
+          </p:cNvSpPr>
+          <p:nvPr>
+            <p:ph idx="1"/>
+          </p:nvPr>
+        </p:nvSpPr>
+        <p:spPr/>
+        <p:txBody>
+          <a:bodyPr/>
+          <a:lstStyle/>
+          <a:p>
+            <a:endParaRPr lang="en-US"/>
+          </a:p>
+        </p:txBody>
+      </p:sp>
+    </p:spTree>
+    <p:extLst>
+      <p:ext uri="{BB962C8B-B14F-4D97-AF65-F5344CB8AC3E}">
+        <p14:creationId xmlns:p14="http://schemas.microsoft.com/office/powerpoint/2010/main" val="1218873839"/>
+      </p:ext>
+    </p:extLst>
+  </p:cSld>
+  <p:clrMapOvr>
+    <a:masterClrMapping/>
+  </p:clrMapOvr>
+</p:sld>
+</file>
+
+<file path=ppt/slides/slide15.xml><?xml version="1.0" encoding="utf-8"?>
+<p:sld xmlns:a="http://schemas.openxmlformats.org/drawingml/2006/main" xmlns:r="http://schemas.openxmlformats.org/officeDocument/2006/relationships" xmlns:p="http://schemas.openxmlformats.org/presentationml/2006/main">
+  <p:cSld>
+    <p:spTree>
+      <p:nvGrpSpPr>
+        <p:cNvPr id="1" name=""/>
+        <p:cNvGrpSpPr/>
+        <p:nvPr/>
+      </p:nvGrpSpPr>
+      <p:grpSpPr>
+        <a:xfrm>
+          <a:off x="0" y="0"/>
+          <a:ext cx="0" cy="0"/>
+          <a:chOff x="0" y="0"/>
+          <a:chExt cx="0" cy="0"/>
+        </a:xfrm>
+      </p:grpSpPr>
+      <p:sp>
+        <p:nvSpPr>
+          <p:cNvPr id="4" name="Cubo 3">
+            <a:extLst>
+              <a:ext uri="{FF2B5EF4-FFF2-40B4-BE49-F238E27FC236}">
+                <a16:creationId xmlns:a16="http://schemas.microsoft.com/office/drawing/2014/main" id="{4620C76E-5866-151E-AB2B-8215B07EE284}"/>
+              </a:ext>
+            </a:extLst>
+          </p:cNvPr>
+          <p:cNvSpPr/>
+          <p:nvPr/>
+        </p:nvSpPr>
+        <p:spPr>
+          <a:xfrm>
+            <a:off x="764262" y="828735"/>
+            <a:ext cx="2606554" cy="1364049"/>
+          </a:xfrm>
+          <a:prstGeom prst="cube">
+            <a:avLst/>
+          </a:prstGeom>
+        </p:spPr>
+        <p:style>
+          <a:lnRef idx="2">
+            <a:schemeClr val="accent6"/>
+          </a:lnRef>
+          <a:fillRef idx="1">
+            <a:schemeClr val="lt1"/>
+          </a:fillRef>
+          <a:effectRef idx="0">
+            <a:schemeClr val="accent6"/>
+          </a:effectRef>
+          <a:fontRef idx="minor">
+            <a:schemeClr val="dk1"/>
+          </a:fontRef>
+        </p:style>
+        <p:txBody>
+          <a:bodyPr rtlCol="0" anchor="ctr"/>
+          <a:lstStyle/>
+          <a:p>
+            <a:pPr algn="ctr"/>
+            <a:r>
+              <a:rPr lang="es-419" b="1" dirty="0"/>
+              <a:t>Conjuntos de Datos</a:t>
+            </a:r>
+          </a:p>
+          <a:p>
+            <a:pPr algn="ctr"/>
+            <a:r>
+              <a:rPr lang="es-419" b="1" dirty="0" err="1">
+                <a:solidFill>
+                  <a:srgbClr val="FF0000"/>
+                </a:solidFill>
+              </a:rPr>
+              <a:t>SpanishMedicaLLM</a:t>
+            </a:r>
+            <a:endParaRPr lang="en-US" b="1" dirty="0">
+              <a:solidFill>
+                <a:srgbClr val="FF0000"/>
+              </a:solidFill>
+            </a:endParaRPr>
+          </a:p>
+        </p:txBody>
+      </p:sp>
+      <p:sp>
+        <p:nvSpPr>
+          <p:cNvPr id="5" name="Cubo 4">
+            <a:extLst>
+              <a:ext uri="{FF2B5EF4-FFF2-40B4-BE49-F238E27FC236}">
+                <a16:creationId xmlns:a16="http://schemas.microsoft.com/office/drawing/2014/main" id="{64A18472-9539-16F0-3B31-B541E549AEC4}"/>
+              </a:ext>
+            </a:extLst>
+          </p:cNvPr>
+          <p:cNvSpPr/>
+          <p:nvPr/>
+        </p:nvSpPr>
+        <p:spPr>
+          <a:xfrm>
+            <a:off x="5273338" y="714652"/>
+            <a:ext cx="2308194" cy="1846556"/>
+          </a:xfrm>
+          <a:prstGeom prst="cube">
+            <a:avLst/>
+          </a:prstGeom>
+        </p:spPr>
+        <p:style>
+          <a:lnRef idx="2">
+            <a:schemeClr val="accent6"/>
+          </a:lnRef>
+          <a:fillRef idx="1">
+            <a:schemeClr val="lt1"/>
+          </a:fillRef>
+          <a:effectRef idx="0">
+            <a:schemeClr val="accent6"/>
+          </a:effectRef>
+          <a:fontRef idx="minor">
+            <a:schemeClr val="dk1"/>
+          </a:fontRef>
+        </p:style>
+        <p:txBody>
+          <a:bodyPr rtlCol="0" anchor="ctr"/>
+          <a:lstStyle/>
+          <a:p>
+            <a:pPr algn="ctr"/>
+            <a:r>
+              <a:rPr lang="es-419" dirty="0"/>
+              <a:t>LLM </a:t>
+            </a:r>
+            <a:r>
+              <a:rPr lang="es-419" dirty="0" err="1"/>
+              <a:t>to</a:t>
+            </a:r>
+            <a:r>
+              <a:rPr lang="es-419" dirty="0"/>
+              <a:t> </a:t>
+            </a:r>
+            <a:r>
+              <a:rPr lang="es-419" dirty="0" err="1"/>
+              <a:t>pretrain</a:t>
+            </a:r>
+            <a:r>
+              <a:rPr lang="es-419" dirty="0"/>
+              <a:t> and </a:t>
+            </a:r>
+            <a:r>
+              <a:rPr lang="es-419" dirty="0" err="1"/>
+              <a:t>finetuning</a:t>
+            </a:r>
+            <a:endParaRPr lang="en-US" dirty="0"/>
+          </a:p>
+        </p:txBody>
+      </p:sp>
+      <p:sp>
+        <p:nvSpPr>
+          <p:cNvPr id="6" name="Cubo 5">
+            <a:extLst>
+              <a:ext uri="{FF2B5EF4-FFF2-40B4-BE49-F238E27FC236}">
+                <a16:creationId xmlns:a16="http://schemas.microsoft.com/office/drawing/2014/main" id="{31589C7C-C2F5-9232-A79B-7CBDA951B1B2}"/>
+              </a:ext>
+            </a:extLst>
+          </p:cNvPr>
+          <p:cNvSpPr/>
+          <p:nvPr/>
+        </p:nvSpPr>
+        <p:spPr>
+          <a:xfrm>
+            <a:off x="6797600" y="2965140"/>
+            <a:ext cx="5116233" cy="1846556"/>
+          </a:xfrm>
+          <a:prstGeom prst="cube">
+            <a:avLst/>
+          </a:prstGeom>
+        </p:spPr>
+        <p:style>
+          <a:lnRef idx="2">
+            <a:schemeClr val="accent6"/>
+          </a:lnRef>
+          <a:fillRef idx="1">
+            <a:schemeClr val="lt1"/>
+          </a:fillRef>
+          <a:effectRef idx="0">
+            <a:schemeClr val="accent6"/>
+          </a:effectRef>
+          <a:fontRef idx="minor">
+            <a:schemeClr val="dk1"/>
+          </a:fontRef>
+        </p:style>
+        <p:txBody>
+          <a:bodyPr rtlCol="0" anchor="ctr"/>
+          <a:lstStyle/>
+          <a:p>
+            <a:pPr algn="ctr"/>
+            <a:r>
+              <a:rPr lang="es-419" dirty="0"/>
+              <a:t>Evaluar con </a:t>
+            </a:r>
+            <a:r>
+              <a:rPr lang="es-419" b="1" dirty="0" err="1"/>
+              <a:t>LenguajeNaturalAI</a:t>
+            </a:r>
+            <a:r>
+              <a:rPr lang="es-419" b="1" dirty="0"/>
+              <a:t>/</a:t>
+            </a:r>
+            <a:r>
+              <a:rPr lang="es-419" b="1" dirty="0" err="1"/>
+              <a:t>casos_clinicos_diagnostico</a:t>
+            </a:r>
+            <a:r>
+              <a:rPr lang="es-419" b="1" dirty="0"/>
+              <a:t> </a:t>
+            </a:r>
+            <a:endParaRPr lang="en-US" dirty="0"/>
+          </a:p>
+        </p:txBody>
+      </p:sp>
+      <p:sp>
+        <p:nvSpPr>
+          <p:cNvPr id="7" name="Flecha: a la derecha 6">
+            <a:extLst>
+              <a:ext uri="{FF2B5EF4-FFF2-40B4-BE49-F238E27FC236}">
+                <a16:creationId xmlns:a16="http://schemas.microsoft.com/office/drawing/2014/main" id="{BB06480D-4F93-F2B7-6F12-0AAF9D5D131A}"/>
+              </a:ext>
+            </a:extLst>
+          </p:cNvPr>
+          <p:cNvSpPr/>
+          <p:nvPr/>
+        </p:nvSpPr>
+        <p:spPr>
+          <a:xfrm>
+            <a:off x="3844031" y="1510759"/>
+            <a:ext cx="736847" cy="363984"/>
+          </a:xfrm>
+          <a:prstGeom prst="rightArrow">
+            <a:avLst/>
+          </a:prstGeom>
+          <a:ln>
+            <a:solidFill>
+              <a:schemeClr val="tx1"/>
+            </a:solidFill>
+          </a:ln>
+        </p:spPr>
+        <p:style>
+          <a:lnRef idx="2">
+            <a:schemeClr val="accent6"/>
+          </a:lnRef>
+          <a:fillRef idx="1">
+            <a:schemeClr val="lt1"/>
+          </a:fillRef>
+          <a:effectRef idx="0">
+            <a:schemeClr val="accent6"/>
+          </a:effectRef>
+          <a:fontRef idx="minor">
+            <a:schemeClr val="dk1"/>
+          </a:fontRef>
+        </p:style>
+        <p:txBody>
+          <a:bodyPr rtlCol="0" anchor="ctr"/>
+          <a:lstStyle/>
+          <a:p>
+            <a:pPr algn="ctr"/>
+            <a:endParaRPr lang="en-US">
+              <a:ln w="0"/>
+              <a:solidFill>
+                <a:schemeClr val="tx1"/>
+              </a:solidFill>
+              <a:effectLst>
+                <a:outerShdw blurRad="38100" dist="19050" dir="2700000" algn="tl" rotWithShape="0">
+                  <a:schemeClr val="dk1">
+                    <a:alpha val="40000"/>
+                  </a:schemeClr>
+                </a:outerShdw>
+              </a:effectLst>
+            </a:endParaRPr>
+          </a:p>
+        </p:txBody>
+      </p:sp>
+      <p:sp>
+        <p:nvSpPr>
+          <p:cNvPr id="9" name="Flecha: a la derecha 8">
+            <a:extLst>
+              <a:ext uri="{FF2B5EF4-FFF2-40B4-BE49-F238E27FC236}">
+                <a16:creationId xmlns:a16="http://schemas.microsoft.com/office/drawing/2014/main" id="{AAA9B8B7-E701-4B7A-8174-05411D11ED9D}"/>
+              </a:ext>
+            </a:extLst>
+          </p:cNvPr>
+          <p:cNvSpPr/>
+          <p:nvPr/>
+        </p:nvSpPr>
+        <p:spPr>
+          <a:xfrm rot="1656679">
+            <a:off x="7843425" y="2249162"/>
+            <a:ext cx="736847" cy="363984"/>
+          </a:xfrm>
+          <a:prstGeom prst="rightArrow">
+            <a:avLst/>
+          </a:prstGeom>
+          <a:ln>
+            <a:solidFill>
+              <a:schemeClr val="tx1"/>
+            </a:solidFill>
+          </a:ln>
+        </p:spPr>
+        <p:style>
+          <a:lnRef idx="2">
+            <a:schemeClr val="accent6"/>
+          </a:lnRef>
+          <a:fillRef idx="1">
+            <a:schemeClr val="lt1"/>
+          </a:fillRef>
+          <a:effectRef idx="0">
+            <a:schemeClr val="accent6"/>
+          </a:effectRef>
+          <a:fontRef idx="minor">
+            <a:schemeClr val="dk1"/>
+          </a:fontRef>
+        </p:style>
+        <p:txBody>
+          <a:bodyPr rtlCol="0" anchor="ctr"/>
+          <a:lstStyle/>
+          <a:p>
+            <a:pPr algn="ctr"/>
+            <a:endParaRPr lang="en-US">
+              <a:ln w="0"/>
+              <a:solidFill>
+                <a:schemeClr val="tx1"/>
+              </a:solidFill>
+              <a:effectLst>
+                <a:outerShdw blurRad="38100" dist="19050" dir="2700000" algn="tl" rotWithShape="0">
+                  <a:schemeClr val="dk1">
+                    <a:alpha val="40000"/>
+                  </a:schemeClr>
+                </a:outerShdw>
+              </a:effectLst>
+            </a:endParaRPr>
+          </a:p>
+        </p:txBody>
+      </p:sp>
+      <p:sp>
+        <p:nvSpPr>
+          <p:cNvPr id="10" name="CuadroTexto 9">
+            <a:extLst>
+              <a:ext uri="{FF2B5EF4-FFF2-40B4-BE49-F238E27FC236}">
+                <a16:creationId xmlns:a16="http://schemas.microsoft.com/office/drawing/2014/main" id="{0C75437A-E142-97F3-4868-4215F340E2A9}"/>
+              </a:ext>
+            </a:extLst>
+          </p:cNvPr>
+          <p:cNvSpPr txBox="1"/>
+          <p:nvPr/>
+        </p:nvSpPr>
+        <p:spPr>
+          <a:xfrm>
+            <a:off x="363986" y="2561208"/>
+            <a:ext cx="5850385" cy="3970318"/>
+          </a:xfrm>
+          <a:prstGeom prst="rect">
+            <a:avLst/>
+          </a:prstGeom>
+          <a:noFill/>
+        </p:spPr>
+        <p:txBody>
+          <a:bodyPr wrap="square" rtlCol="0">
+            <a:spAutoFit/>
+          </a:bodyPr>
+          <a:lstStyle/>
+          <a:p>
+            <a:r>
+              <a:rPr lang="es-419" b="1" dirty="0"/>
+              <a:t>Preprocesamiento:</a:t>
+            </a:r>
+          </a:p>
+          <a:p>
+            <a:r>
+              <a:rPr lang="es-419" dirty="0"/>
+              <a:t>1- </a:t>
+            </a:r>
+            <a:r>
+              <a:rPr lang="es-419" dirty="0" err="1"/>
+              <a:t>Pretraining</a:t>
+            </a:r>
+            <a:r>
+              <a:rPr lang="es-419" dirty="0"/>
+              <a:t> con los textos </a:t>
+            </a:r>
+            <a:r>
+              <a:rPr lang="es-419" dirty="0" err="1"/>
+              <a:t>open_text</a:t>
+            </a:r>
+            <a:r>
+              <a:rPr lang="es-419" dirty="0"/>
+              <a:t> y con los que no tienen </a:t>
+            </a:r>
+            <a:r>
+              <a:rPr lang="es-419" dirty="0" err="1"/>
+              <a:t>topic</a:t>
+            </a:r>
+            <a:endParaRPr lang="es-419" dirty="0"/>
+          </a:p>
+          <a:p>
+            <a:endParaRPr lang="es-419" dirty="0"/>
+          </a:p>
+          <a:p>
+            <a:r>
+              <a:rPr lang="es-419" dirty="0"/>
+              <a:t>2- Llevar al esquema del corpus de </a:t>
+            </a:r>
+            <a:r>
+              <a:rPr lang="es-419" b="1" dirty="0" err="1"/>
+              <a:t>LenguajeNaturalAI</a:t>
+            </a:r>
+            <a:r>
+              <a:rPr lang="es-419" b="1" dirty="0"/>
+              <a:t>/</a:t>
+            </a:r>
+            <a:r>
+              <a:rPr lang="es-419" b="1" dirty="0" err="1"/>
+              <a:t>casos_clinicos_diagnostico</a:t>
+            </a:r>
+            <a:r>
+              <a:rPr lang="es-419" b="1" dirty="0"/>
+              <a:t>  </a:t>
+            </a:r>
+            <a:r>
+              <a:rPr lang="es-419" dirty="0"/>
+              <a:t>y autoajustar.</a:t>
+            </a:r>
+          </a:p>
+          <a:p>
+            <a:endParaRPr lang="es-419" dirty="0"/>
+          </a:p>
+          <a:p>
+            <a:r>
+              <a:rPr lang="es-419" dirty="0"/>
+              <a:t>3- Evaluar los resultados con los test de </a:t>
+            </a:r>
+            <a:r>
+              <a:rPr lang="es-419" b="1" dirty="0" err="1"/>
+              <a:t>LenguajeNaturalAI</a:t>
+            </a:r>
+            <a:r>
+              <a:rPr lang="es-419" b="1" dirty="0"/>
+              <a:t>/</a:t>
+            </a:r>
+            <a:r>
+              <a:rPr lang="es-419" b="1" dirty="0" err="1"/>
+              <a:t>casos_clinicos_diagnostico</a:t>
+            </a:r>
+            <a:r>
+              <a:rPr lang="es-419" b="1" dirty="0"/>
+              <a:t> </a:t>
+            </a:r>
+          </a:p>
+          <a:p>
+            <a:endParaRPr lang="es-419" dirty="0"/>
+          </a:p>
+          <a:p>
+            <a:r>
+              <a:rPr lang="es-419" dirty="0"/>
+              <a:t>  </a:t>
+            </a:r>
+            <a:r>
+              <a:rPr lang="es-419" b="1" dirty="0"/>
+              <a:t>Nota:</a:t>
+            </a:r>
+            <a:r>
+              <a:rPr lang="es-419" dirty="0"/>
+              <a:t> en este caso hay que chequear como fue entrenado el modelo como son los de </a:t>
+            </a:r>
+            <a:r>
+              <a:rPr lang="es-419" dirty="0" err="1"/>
+              <a:t>Meditron</a:t>
+            </a:r>
+            <a:r>
+              <a:rPr lang="es-419" dirty="0"/>
+              <a:t> y </a:t>
+            </a:r>
+            <a:r>
+              <a:rPr lang="es-419" dirty="0" err="1"/>
+              <a:t>BioMistral</a:t>
+            </a:r>
+            <a:r>
+              <a:rPr lang="es-419" dirty="0"/>
+              <a:t> que tuvieron un formato en las instrucciones de </a:t>
+            </a:r>
+            <a:r>
+              <a:rPr lang="es-419" dirty="0" err="1"/>
+              <a:t>entreda</a:t>
+            </a:r>
+            <a:r>
+              <a:rPr lang="es-419" dirty="0"/>
+              <a:t> </a:t>
+            </a:r>
+            <a:endParaRPr lang="en-US" dirty="0"/>
+          </a:p>
+        </p:txBody>
+      </p:sp>
+      <p:sp>
+        <p:nvSpPr>
+          <p:cNvPr id="11" name="CuadroTexto 10">
+            <a:extLst>
+              <a:ext uri="{FF2B5EF4-FFF2-40B4-BE49-F238E27FC236}">
+                <a16:creationId xmlns:a16="http://schemas.microsoft.com/office/drawing/2014/main" id="{966684E4-F117-A911-AD8B-B2375E32DE31}"/>
+              </a:ext>
+            </a:extLst>
+          </p:cNvPr>
+          <p:cNvSpPr txBox="1"/>
+          <p:nvPr/>
+        </p:nvSpPr>
+        <p:spPr>
+          <a:xfrm>
+            <a:off x="8273992" y="422034"/>
+            <a:ext cx="2876365" cy="646331"/>
+          </a:xfrm>
+          <a:prstGeom prst="rect">
+            <a:avLst/>
+          </a:prstGeom>
+          <a:noFill/>
+        </p:spPr>
+        <p:txBody>
+          <a:bodyPr wrap="square" rtlCol="0">
+            <a:spAutoFit/>
+          </a:bodyPr>
+          <a:lstStyle/>
+          <a:p>
+            <a:r>
+              <a:rPr lang="en-US" dirty="0" err="1">
+                <a:solidFill>
+                  <a:srgbClr val="002060"/>
+                </a:solidFill>
+              </a:rPr>
+              <a:t>projecte-aina</a:t>
+            </a:r>
+            <a:r>
+              <a:rPr lang="en-US" dirty="0">
+                <a:solidFill>
+                  <a:srgbClr val="002060"/>
+                </a:solidFill>
+              </a:rPr>
+              <a:t>/aguila-7b</a:t>
+            </a:r>
+          </a:p>
+          <a:p>
+            <a:r>
+              <a:rPr lang="en-US" dirty="0" err="1">
+                <a:solidFill>
+                  <a:srgbClr val="002060"/>
+                </a:solidFill>
+              </a:rPr>
+              <a:t>clibrain</a:t>
+            </a:r>
+            <a:r>
+              <a:rPr lang="en-US" dirty="0">
+                <a:solidFill>
+                  <a:srgbClr val="002060"/>
+                </a:solidFill>
+              </a:rPr>
+              <a:t>/</a:t>
+            </a:r>
+            <a:r>
+              <a:rPr lang="en-US" dirty="0" err="1">
+                <a:solidFill>
+                  <a:srgbClr val="002060"/>
+                </a:solidFill>
+              </a:rPr>
+              <a:t>lince</a:t>
+            </a:r>
+            <a:r>
+              <a:rPr lang="en-US" dirty="0">
+                <a:solidFill>
+                  <a:srgbClr val="002060"/>
+                </a:solidFill>
+              </a:rPr>
+              <a:t>-zero</a:t>
+            </a:r>
+          </a:p>
+        </p:txBody>
+      </p:sp>
+      <p:sp>
+        <p:nvSpPr>
+          <p:cNvPr id="12" name="CuadroTexto 11">
+            <a:extLst>
+              <a:ext uri="{FF2B5EF4-FFF2-40B4-BE49-F238E27FC236}">
+                <a16:creationId xmlns:a16="http://schemas.microsoft.com/office/drawing/2014/main" id="{2056C4E4-B5E8-3F7B-D534-3647E448B86F}"/>
+              </a:ext>
+            </a:extLst>
+          </p:cNvPr>
+          <p:cNvSpPr txBox="1"/>
+          <p:nvPr/>
+        </p:nvSpPr>
+        <p:spPr>
+          <a:xfrm>
+            <a:off x="8392100" y="1342719"/>
+            <a:ext cx="2876365" cy="369332"/>
+          </a:xfrm>
+          <a:prstGeom prst="rect">
+            <a:avLst/>
+          </a:prstGeom>
+          <a:noFill/>
+        </p:spPr>
+        <p:txBody>
+          <a:bodyPr wrap="square" rtlCol="0">
+            <a:spAutoFit/>
+          </a:bodyPr>
+          <a:lstStyle/>
+          <a:p>
+            <a:r>
+              <a:rPr lang="en-US" dirty="0" err="1">
+                <a:solidFill>
+                  <a:srgbClr val="FF0000"/>
+                </a:solidFill>
+              </a:rPr>
+              <a:t>epfl-llm</a:t>
+            </a:r>
+            <a:r>
+              <a:rPr lang="en-US" dirty="0">
+                <a:solidFill>
+                  <a:srgbClr val="FF0000"/>
+                </a:solidFill>
+              </a:rPr>
+              <a:t>/meditron-7b</a:t>
+            </a:r>
+          </a:p>
+        </p:txBody>
+      </p:sp>
+      <p:sp>
+        <p:nvSpPr>
+          <p:cNvPr id="13" name="CuadroTexto 12">
+            <a:extLst>
+              <a:ext uri="{FF2B5EF4-FFF2-40B4-BE49-F238E27FC236}">
+                <a16:creationId xmlns:a16="http://schemas.microsoft.com/office/drawing/2014/main" id="{4B1731C5-7A04-8965-F185-5D9EA89E50B9}"/>
+              </a:ext>
+            </a:extLst>
+          </p:cNvPr>
+          <p:cNvSpPr txBox="1"/>
+          <p:nvPr/>
+        </p:nvSpPr>
+        <p:spPr>
+          <a:xfrm>
+            <a:off x="8273992" y="1888714"/>
+            <a:ext cx="2876364" cy="369332"/>
+          </a:xfrm>
+          <a:prstGeom prst="rect">
+            <a:avLst/>
+          </a:prstGeom>
+          <a:noFill/>
+        </p:spPr>
+        <p:txBody>
+          <a:bodyPr wrap="square" rtlCol="0">
+            <a:spAutoFit/>
+          </a:bodyPr>
+          <a:lstStyle/>
+          <a:p>
+            <a:r>
+              <a:rPr lang="en-US" dirty="0" err="1">
+                <a:solidFill>
+                  <a:srgbClr val="00B050"/>
+                </a:solidFill>
+              </a:rPr>
+              <a:t>BioMistral</a:t>
+            </a:r>
+            <a:r>
+              <a:rPr lang="en-US" dirty="0">
+                <a:solidFill>
+                  <a:srgbClr val="00B050"/>
+                </a:solidFill>
+              </a:rPr>
+              <a:t>/BioMistral-7B</a:t>
+            </a:r>
+          </a:p>
+        </p:txBody>
+      </p:sp>
+    </p:spTree>
+    <p:extLst>
+      <p:ext uri="{BB962C8B-B14F-4D97-AF65-F5344CB8AC3E}">
+        <p14:creationId xmlns:p14="http://schemas.microsoft.com/office/powerpoint/2010/main" val="806838804"/>
+      </p:ext>
+    </p:extLst>
+  </p:cSld>
+  <p:clrMapOvr>
+    <a:masterClrMapping/>
+  </p:clrMapOvr>
+</p:sld>
+</file>
+
+<file path=ppt/slides/slide16.xml><?xml version="1.0" encoding="utf-8"?>
+<p:sld xmlns:a="http://schemas.openxmlformats.org/drawingml/2006/main" xmlns:r="http://schemas.openxmlformats.org/officeDocument/2006/relationships" xmlns:p="http://schemas.openxmlformats.org/presentationml/2006/main">
+  <p:cSld>
+    <p:spTree>
+      <p:nvGrpSpPr>
+        <p:cNvPr id="1" name=""/>
+        <p:cNvGrpSpPr/>
+        <p:nvPr/>
+      </p:nvGrpSpPr>
+      <p:grpSpPr>
+        <a:xfrm>
+          <a:off x="0" y="0"/>
+          <a:ext cx="0" cy="0"/>
+          <a:chOff x="0" y="0"/>
+          <a:chExt cx="0" cy="0"/>
+        </a:xfrm>
+      </p:grpSpPr>
+      <p:sp>
+        <p:nvSpPr>
+          <p:cNvPr id="2" name="Título 1">
+            <a:extLst>
+              <a:ext uri="{FF2B5EF4-FFF2-40B4-BE49-F238E27FC236}">
                 <a16:creationId xmlns:a16="http://schemas.microsoft.com/office/drawing/2014/main" id="{F13956E8-7E9D-E63A-B3FD-FE7E7C0A0BF3}"/>
               </a:ext>
             </a:extLst>

</xml_diff>